<commit_message>
:memo: atualização do pptx da live com a lista de links úteis
</commit_message>
<xml_diff>
--- a/#Live Piloto - Pentaho Data Integration - PDI.pptx
+++ b/#Live Piloto - Pentaho Data Integration - PDI.pptx
@@ -5,13 +5,14 @@
     <p:sldMasterId id="2147483648" r:id="rId1"/>
   </p:sldMasterIdLst>
   <p:notesMasterIdLst>
-    <p:notesMasterId r:id="rId6"/>
+    <p:notesMasterId r:id="rId7"/>
   </p:notesMasterIdLst>
   <p:sldIdLst>
     <p:sldId id="256" r:id="rId2"/>
     <p:sldId id="257" r:id="rId3"/>
     <p:sldId id="258" r:id="rId4"/>
     <p:sldId id="259" r:id="rId5"/>
+    <p:sldId id="260" r:id="rId6"/>
   </p:sldIdLst>
   <p:sldSz cx="12192000" cy="6858000"/>
   <p:notesSz cx="6858000" cy="9144000"/>
@@ -200,7 +201,7 @@
           <a:p>
             <a:fld id="{06104AC7-E9AD-48A7-9E9F-21B91A771B37}" type="datetimeFigureOut">
               <a:rPr lang="pt-BR" smtClean="0"/>
-              <a:t>08/09/2022</a:t>
+              <a:t>10/09/2022</a:t>
             </a:fld>
             <a:endParaRPr lang="pt-BR"/>
           </a:p>
@@ -636,6 +637,90 @@
 </p:notes>
 </file>
 
+<file path=ppt/notesSlides/notesSlide3.xml><?xml version="1.0" encoding="utf-8"?>
+<p:notes xmlns:a="http://schemas.openxmlformats.org/drawingml/2006/main" xmlns:r="http://schemas.openxmlformats.org/officeDocument/2006/relationships" xmlns:p="http://schemas.openxmlformats.org/presentationml/2006/main">
+  <p:cSld>
+    <p:spTree>
+      <p:nvGrpSpPr>
+        <p:cNvPr id="1" name=""/>
+        <p:cNvGrpSpPr/>
+        <p:nvPr/>
+      </p:nvGrpSpPr>
+      <p:grpSpPr>
+        <a:xfrm>
+          <a:off x="0" y="0"/>
+          <a:ext cx="0" cy="0"/>
+          <a:chOff x="0" y="0"/>
+          <a:chExt cx="0" cy="0"/>
+        </a:xfrm>
+      </p:grpSpPr>
+      <p:sp>
+        <p:nvSpPr>
+          <p:cNvPr id="2" name="Marcador de Posição da Imagem do Diapositivo 1"/>
+          <p:cNvSpPr>
+            <a:spLocks noGrp="1" noRot="1" noChangeAspect="1"/>
+          </p:cNvSpPr>
+          <p:nvPr>
+            <p:ph type="sldImg"/>
+          </p:nvPr>
+        </p:nvSpPr>
+        <p:spPr/>
+      </p:sp>
+      <p:sp>
+        <p:nvSpPr>
+          <p:cNvPr id="3" name="Marcador de Posição de Notas 2"/>
+          <p:cNvSpPr>
+            <a:spLocks noGrp="1"/>
+          </p:cNvSpPr>
+          <p:nvPr>
+            <p:ph type="body" idx="1"/>
+          </p:nvPr>
+        </p:nvSpPr>
+        <p:spPr/>
+        <p:txBody>
+          <a:bodyPr/>
+          <a:lstStyle/>
+          <a:p>
+            <a:endParaRPr lang="pt-BR" dirty="0"/>
+          </a:p>
+        </p:txBody>
+      </p:sp>
+      <p:sp>
+        <p:nvSpPr>
+          <p:cNvPr id="4" name="Marcador de Posição do Número do Diapositivo 3"/>
+          <p:cNvSpPr>
+            <a:spLocks noGrp="1"/>
+          </p:cNvSpPr>
+          <p:nvPr>
+            <p:ph type="sldNum" sz="quarter" idx="5"/>
+          </p:nvPr>
+        </p:nvSpPr>
+        <p:spPr/>
+        <p:txBody>
+          <a:bodyPr/>
+          <a:lstStyle/>
+          <a:p>
+            <a:fld id="{DEC6DF80-29D3-4536-8531-7AA8194FAD77}" type="slidenum">
+              <a:rPr lang="pt-BR" smtClean="0"/>
+              <a:t>5</a:t>
+            </a:fld>
+            <a:endParaRPr lang="pt-BR"/>
+          </a:p>
+        </p:txBody>
+      </p:sp>
+    </p:spTree>
+    <p:extLst>
+      <p:ext uri="{BB962C8B-B14F-4D97-AF65-F5344CB8AC3E}">
+        <p14:creationId xmlns:p14="http://schemas.microsoft.com/office/powerpoint/2010/main" val="2996529719"/>
+      </p:ext>
+    </p:extLst>
+  </p:cSld>
+  <p:clrMapOvr>
+    <a:masterClrMapping/>
+  </p:clrMapOvr>
+</p:notes>
+</file>
+
 <file path=ppt/slideLayouts/slideLayout1.xml><?xml version="1.0" encoding="utf-8"?>
 <p:sldLayout xmlns:a="http://schemas.openxmlformats.org/drawingml/2006/main" xmlns:r="http://schemas.openxmlformats.org/officeDocument/2006/relationships" xmlns:p="http://schemas.openxmlformats.org/presentationml/2006/main" type="title" preserve="1">
   <p:cSld name="Diapositivo de Título">
@@ -785,7 +870,7 @@
           <a:p>
             <a:fld id="{328C59F1-DD81-4401-8226-A92C8367A5FF}" type="datetimeFigureOut">
               <a:rPr lang="pt-BR" smtClean="0"/>
-              <a:t>08/09/2022</a:t>
+              <a:t>10/09/2022</a:t>
             </a:fld>
             <a:endParaRPr lang="pt-BR"/>
           </a:p>
@@ -985,7 +1070,7 @@
           <a:p>
             <a:fld id="{328C59F1-DD81-4401-8226-A92C8367A5FF}" type="datetimeFigureOut">
               <a:rPr lang="pt-BR" smtClean="0"/>
-              <a:t>08/09/2022</a:t>
+              <a:t>10/09/2022</a:t>
             </a:fld>
             <a:endParaRPr lang="pt-BR"/>
           </a:p>
@@ -1195,7 +1280,7 @@
           <a:p>
             <a:fld id="{328C59F1-DD81-4401-8226-A92C8367A5FF}" type="datetimeFigureOut">
               <a:rPr lang="pt-BR" smtClean="0"/>
-              <a:t>08/09/2022</a:t>
+              <a:t>10/09/2022</a:t>
             </a:fld>
             <a:endParaRPr lang="pt-BR"/>
           </a:p>
@@ -1395,7 +1480,7 @@
           <a:p>
             <a:fld id="{328C59F1-DD81-4401-8226-A92C8367A5FF}" type="datetimeFigureOut">
               <a:rPr lang="pt-BR" smtClean="0"/>
-              <a:t>08/09/2022</a:t>
+              <a:t>10/09/2022</a:t>
             </a:fld>
             <a:endParaRPr lang="pt-BR"/>
           </a:p>
@@ -1671,7 +1756,7 @@
           <a:p>
             <a:fld id="{328C59F1-DD81-4401-8226-A92C8367A5FF}" type="datetimeFigureOut">
               <a:rPr lang="pt-BR" smtClean="0"/>
-              <a:t>08/09/2022</a:t>
+              <a:t>10/09/2022</a:t>
             </a:fld>
             <a:endParaRPr lang="pt-BR"/>
           </a:p>
@@ -1939,7 +2024,7 @@
           <a:p>
             <a:fld id="{328C59F1-DD81-4401-8226-A92C8367A5FF}" type="datetimeFigureOut">
               <a:rPr lang="pt-BR" smtClean="0"/>
-              <a:t>08/09/2022</a:t>
+              <a:t>10/09/2022</a:t>
             </a:fld>
             <a:endParaRPr lang="pt-BR"/>
           </a:p>
@@ -2354,7 +2439,7 @@
           <a:p>
             <a:fld id="{328C59F1-DD81-4401-8226-A92C8367A5FF}" type="datetimeFigureOut">
               <a:rPr lang="pt-BR" smtClean="0"/>
-              <a:t>08/09/2022</a:t>
+              <a:t>10/09/2022</a:t>
             </a:fld>
             <a:endParaRPr lang="pt-BR"/>
           </a:p>
@@ -2496,7 +2581,7 @@
           <a:p>
             <a:fld id="{328C59F1-DD81-4401-8226-A92C8367A5FF}" type="datetimeFigureOut">
               <a:rPr lang="pt-BR" smtClean="0"/>
-              <a:t>08/09/2022</a:t>
+              <a:t>10/09/2022</a:t>
             </a:fld>
             <a:endParaRPr lang="pt-BR"/>
           </a:p>
@@ -2609,7 +2694,7 @@
           <a:p>
             <a:fld id="{328C59F1-DD81-4401-8226-A92C8367A5FF}" type="datetimeFigureOut">
               <a:rPr lang="pt-BR" smtClean="0"/>
-              <a:t>08/09/2022</a:t>
+              <a:t>10/09/2022</a:t>
             </a:fld>
             <a:endParaRPr lang="pt-BR"/>
           </a:p>
@@ -2922,7 +3007,7 @@
           <a:p>
             <a:fld id="{328C59F1-DD81-4401-8226-A92C8367A5FF}" type="datetimeFigureOut">
               <a:rPr lang="pt-BR" smtClean="0"/>
-              <a:t>08/09/2022</a:t>
+              <a:t>10/09/2022</a:t>
             </a:fld>
             <a:endParaRPr lang="pt-BR"/>
           </a:p>
@@ -3211,7 +3296,7 @@
           <a:p>
             <a:fld id="{328C59F1-DD81-4401-8226-A92C8367A5FF}" type="datetimeFigureOut">
               <a:rPr lang="pt-BR" smtClean="0"/>
-              <a:t>08/09/2022</a:t>
+              <a:t>10/09/2022</a:t>
             </a:fld>
             <a:endParaRPr lang="pt-BR"/>
           </a:p>
@@ -3463,7 +3548,7 @@
           <a:p>
             <a:fld id="{328C59F1-DD81-4401-8226-A92C8367A5FF}" type="datetimeFigureOut">
               <a:rPr lang="pt-BR" smtClean="0"/>
-              <a:t>08/09/2022</a:t>
+              <a:t>10/09/2022</a:t>
             </a:fld>
             <a:endParaRPr lang="pt-BR"/>
           </a:p>
@@ -4967,6 +5052,292 @@
     <p:extLst>
       <p:ext uri="{BB962C8B-B14F-4D97-AF65-F5344CB8AC3E}">
         <p14:creationId xmlns:p14="http://schemas.microsoft.com/office/powerpoint/2010/main" val="1401237803"/>
+      </p:ext>
+    </p:extLst>
+  </p:cSld>
+  <p:clrMapOvr>
+    <a:masterClrMapping/>
+  </p:clrMapOvr>
+</p:sld>
+</file>
+
+<file path=ppt/slides/slide5.xml><?xml version="1.0" encoding="utf-8"?>
+<p:sld xmlns:a="http://schemas.openxmlformats.org/drawingml/2006/main" xmlns:r="http://schemas.openxmlformats.org/officeDocument/2006/relationships" xmlns:p="http://schemas.openxmlformats.org/presentationml/2006/main">
+  <p:cSld>
+    <p:spTree>
+      <p:nvGrpSpPr>
+        <p:cNvPr id="1" name=""/>
+        <p:cNvGrpSpPr/>
+        <p:nvPr/>
+      </p:nvGrpSpPr>
+      <p:grpSpPr>
+        <a:xfrm>
+          <a:off x="0" y="0"/>
+          <a:ext cx="0" cy="0"/>
+          <a:chOff x="0" y="0"/>
+          <a:chExt cx="0" cy="0"/>
+        </a:xfrm>
+      </p:grpSpPr>
+      <p:sp>
+        <p:nvSpPr>
+          <p:cNvPr id="5" name="Fluxograma: Introdução Manual 4">
+            <a:extLst>
+              <a:ext uri="{FF2B5EF4-FFF2-40B4-BE49-F238E27FC236}">
+                <a16:creationId xmlns:a16="http://schemas.microsoft.com/office/drawing/2014/main" id="{5C96CB77-38FF-FA79-725C-92C31D9FD2E9}"/>
+              </a:ext>
+            </a:extLst>
+          </p:cNvPr>
+          <p:cNvSpPr/>
+          <p:nvPr/>
+        </p:nvSpPr>
+        <p:spPr>
+          <a:xfrm>
+            <a:off x="6942337" y="6258758"/>
+            <a:ext cx="5249663" cy="599242"/>
+          </a:xfrm>
+          <a:prstGeom prst="flowChartManualInput">
+            <a:avLst/>
+          </a:prstGeom>
+          <a:gradFill flip="none" rotWithShape="1">
+            <a:gsLst>
+              <a:gs pos="0">
+                <a:srgbClr val="3A3F59">
+                  <a:shade val="30000"/>
+                  <a:satMod val="115000"/>
+                </a:srgbClr>
+              </a:gs>
+              <a:gs pos="50000">
+                <a:srgbClr val="3A3F59">
+                  <a:shade val="67500"/>
+                  <a:satMod val="115000"/>
+                </a:srgbClr>
+              </a:gs>
+              <a:gs pos="100000">
+                <a:srgbClr val="3A3F59">
+                  <a:shade val="100000"/>
+                  <a:satMod val="115000"/>
+                </a:srgbClr>
+              </a:gs>
+            </a:gsLst>
+            <a:lin ang="5400000" scaled="1"/>
+            <a:tileRect/>
+          </a:gradFill>
+          <a:ln>
+            <a:noFill/>
+          </a:ln>
+        </p:spPr>
+        <p:style>
+          <a:lnRef idx="2">
+            <a:schemeClr val="accent1">
+              <a:shade val="50000"/>
+            </a:schemeClr>
+          </a:lnRef>
+          <a:fillRef idx="1">
+            <a:schemeClr val="accent1"/>
+          </a:fillRef>
+          <a:effectRef idx="0">
+            <a:schemeClr val="accent1"/>
+          </a:effectRef>
+          <a:fontRef idx="minor">
+            <a:schemeClr val="lt1"/>
+          </a:fontRef>
+        </p:style>
+        <p:txBody>
+          <a:bodyPr rtlCol="0" anchor="ctr"/>
+          <a:lstStyle/>
+          <a:p>
+            <a:pPr algn="ctr"/>
+            <a:endParaRPr lang="pt-BR"/>
+          </a:p>
+        </p:txBody>
+      </p:sp>
+      <p:pic>
+        <p:nvPicPr>
+          <p:cNvPr id="10" name="Imagem 9">
+            <a:extLst>
+              <a:ext uri="{FF2B5EF4-FFF2-40B4-BE49-F238E27FC236}">
+                <a16:creationId xmlns:a16="http://schemas.microsoft.com/office/drawing/2014/main" id="{4D4A61E9-C57C-8E1A-26D1-29A39BFF2B07}"/>
+              </a:ext>
+            </a:extLst>
+          </p:cNvPr>
+          <p:cNvPicPr>
+            <a:picLocks noChangeAspect="1"/>
+          </p:cNvPicPr>
+          <p:nvPr/>
+        </p:nvPicPr>
+        <p:blipFill>
+          <a:blip r:embed="rId3">
+            <a:extLst>
+              <a:ext uri="{28A0092B-C50C-407E-A947-70E740481C1C}">
+                <a14:useLocalDpi xmlns:a14="http://schemas.microsoft.com/office/drawing/2010/main" val="0"/>
+              </a:ext>
+            </a:extLst>
+          </a:blip>
+          <a:stretch>
+            <a:fillRect/>
+          </a:stretch>
+        </p:blipFill>
+        <p:spPr>
+          <a:xfrm>
+            <a:off x="9716352" y="5670057"/>
+            <a:ext cx="2368761" cy="1865421"/>
+          </a:xfrm>
+          <a:prstGeom prst="rect">
+            <a:avLst/>
+          </a:prstGeom>
+        </p:spPr>
+      </p:pic>
+      <p:sp>
+        <p:nvSpPr>
+          <p:cNvPr id="4" name="CaixaDeTexto 3">
+            <a:extLst>
+              <a:ext uri="{FF2B5EF4-FFF2-40B4-BE49-F238E27FC236}">
+                <a16:creationId xmlns:a16="http://schemas.microsoft.com/office/drawing/2014/main" id="{3A029A0B-096B-3FCE-A58B-795EA86ED4C5}"/>
+              </a:ext>
+            </a:extLst>
+          </p:cNvPr>
+          <p:cNvSpPr txBox="1"/>
+          <p:nvPr/>
+        </p:nvSpPr>
+        <p:spPr>
+          <a:xfrm>
+            <a:off x="6942337" y="6448878"/>
+            <a:ext cx="2243355" cy="307777"/>
+          </a:xfrm>
+          <a:prstGeom prst="rect">
+            <a:avLst/>
+          </a:prstGeom>
+          <a:noFill/>
+        </p:spPr>
+        <p:txBody>
+          <a:bodyPr wrap="square">
+            <a:spAutoFit/>
+          </a:bodyPr>
+          <a:lstStyle/>
+          <a:p>
+            <a:r>
+              <a:rPr lang="pt-BR" sz="1400" dirty="0">
+                <a:solidFill>
+                  <a:schemeClr val="bg1"/>
+                </a:solidFill>
+                <a:latin typeface="Bahnschrift SemiLight SemiConde" panose="020B0502040204020203" pitchFamily="34" charset="0"/>
+              </a:rPr>
+              <a:t>gab.ribeiroaraujo@gmail.com</a:t>
+            </a:r>
+          </a:p>
+        </p:txBody>
+      </p:sp>
+      <p:sp>
+        <p:nvSpPr>
+          <p:cNvPr id="2" name="CaixaDeTexto 1">
+            <a:extLst>
+              <a:ext uri="{FF2B5EF4-FFF2-40B4-BE49-F238E27FC236}">
+                <a16:creationId xmlns:a16="http://schemas.microsoft.com/office/drawing/2014/main" id="{2EA603EA-24F3-0DE6-510E-BDE8CB6C169A}"/>
+              </a:ext>
+            </a:extLst>
+          </p:cNvPr>
+          <p:cNvSpPr txBox="1"/>
+          <p:nvPr/>
+        </p:nvSpPr>
+        <p:spPr>
+          <a:xfrm>
+            <a:off x="800889" y="342488"/>
+            <a:ext cx="3877643" cy="769441"/>
+          </a:xfrm>
+          <a:prstGeom prst="rect">
+            <a:avLst/>
+          </a:prstGeom>
+          <a:noFill/>
+        </p:spPr>
+        <p:txBody>
+          <a:bodyPr wrap="square" rtlCol="0">
+            <a:spAutoFit/>
+          </a:bodyPr>
+          <a:lstStyle/>
+          <a:p>
+            <a:r>
+              <a:rPr lang="pt-BR" sz="4400" dirty="0">
+                <a:solidFill>
+                  <a:schemeClr val="bg1"/>
+                </a:solidFill>
+                <a:latin typeface="Bahnschrift SemiLight SemiConde" panose="020B0502040204020203" pitchFamily="34" charset="0"/>
+              </a:rPr>
+              <a:t>Links Úteis</a:t>
+            </a:r>
+          </a:p>
+        </p:txBody>
+      </p:sp>
+      <p:sp>
+        <p:nvSpPr>
+          <p:cNvPr id="6" name="CaixaDeTexto 5">
+            <a:extLst>
+              <a:ext uri="{FF2B5EF4-FFF2-40B4-BE49-F238E27FC236}">
+                <a16:creationId xmlns:a16="http://schemas.microsoft.com/office/drawing/2014/main" id="{A4FE3808-3293-E212-ED5C-D4B984310CDA}"/>
+              </a:ext>
+            </a:extLst>
+          </p:cNvPr>
+          <p:cNvSpPr txBox="1"/>
+          <p:nvPr/>
+        </p:nvSpPr>
+        <p:spPr>
+          <a:xfrm>
+            <a:off x="800889" y="1293173"/>
+            <a:ext cx="10156054" cy="1077218"/>
+          </a:xfrm>
+          <a:prstGeom prst="rect">
+            <a:avLst/>
+          </a:prstGeom>
+          <a:noFill/>
+        </p:spPr>
+        <p:txBody>
+          <a:bodyPr wrap="square" rtlCol="0">
+            <a:spAutoFit/>
+          </a:bodyPr>
+          <a:lstStyle/>
+          <a:p>
+            <a:r>
+              <a:rPr lang="pt-BR" sz="1600" dirty="0">
+                <a:solidFill>
+                  <a:schemeClr val="bg1"/>
+                </a:solidFill>
+                <a:latin typeface="Bahnschrift SemiLight SemiConde" panose="020B0502040204020203" pitchFamily="34" charset="0"/>
+              </a:rPr>
+              <a:t>Download CSV: https://www.gov.br/prf/pt-br/acesso-a-informacao/dados-abertos/dados-abertos-infracoes (Janeiro/2021)</a:t>
+            </a:r>
+          </a:p>
+          <a:p>
+            <a:endParaRPr lang="pt-BR" sz="1600" dirty="0">
+              <a:solidFill>
+                <a:schemeClr val="bg1"/>
+              </a:solidFill>
+              <a:latin typeface="Bahnschrift SemiLight SemiConde" panose="020B0502040204020203" pitchFamily="34" charset="0"/>
+            </a:endParaRPr>
+          </a:p>
+          <a:p>
+            <a:r>
+              <a:rPr lang="pt-BR" sz="1600" dirty="0">
+                <a:solidFill>
+                  <a:schemeClr val="bg1"/>
+                </a:solidFill>
+                <a:latin typeface="Bahnschrift SemiLight SemiConde" panose="020B0502040204020203" pitchFamily="34" charset="0"/>
+              </a:rPr>
+              <a:t>Download Excel: https://docs.google.com/spreadsheets/d/1SymzLOrPrz-36vEolg_H-vemnNZdw1hB/edit#gid=2020667092</a:t>
+            </a:r>
+          </a:p>
+          <a:p>
+            <a:endParaRPr lang="pt-BR" sz="1600" dirty="0">
+              <a:solidFill>
+                <a:schemeClr val="bg1"/>
+              </a:solidFill>
+              <a:latin typeface="Bahnschrift SemiLight SemiConde" panose="020B0502040204020203" pitchFamily="34" charset="0"/>
+            </a:endParaRPr>
+          </a:p>
+        </p:txBody>
+      </p:sp>
+    </p:spTree>
+    <p:extLst>
+      <p:ext uri="{BB962C8B-B14F-4D97-AF65-F5344CB8AC3E}">
+        <p14:creationId xmlns:p14="http://schemas.microsoft.com/office/powerpoint/2010/main" val="2556908362"/>
       </p:ext>
     </p:extLst>
   </p:cSld>

</xml_diff>